<commit_message>
Adding Toxic-Comments, Classy Words
</commit_message>
<xml_diff>
--- a/Kessler-Puppy-2018-02-21.pptx
+++ b/Kessler-Puppy-2018-02-21.pptx
@@ -3648,7 +3648,7 @@
         <p:spPr>
           <a:xfrm>
             <a:off x="4261619" y="6337756"/>
-            <a:ext cx="3668761" cy="430887"/>
+            <a:ext cx="3747308" cy="430887"/>
           </a:xfrm>
           <a:prstGeom prst="rect">
             <a:avLst/>
@@ -3674,6 +3674,7 @@
                 <a:latin typeface="Helvetica" charset="0"/>
                 <a:ea typeface="Helvetica" charset="0"/>
                 <a:cs typeface="Helvetica" charset="0"/>
+                <a:hlinkClick r:id="rId3"/>
               </a:rPr>
               <a:t>that</a:t>
             </a:r>
@@ -3683,7 +3684,15 @@
                 <a:ea typeface="Helvetica" charset="0"/>
                 <a:cs typeface="Helvetica" charset="0"/>
               </a:rPr>
-              <a:t> Jason Kessler.</a:t>
+              <a:t> Jason </a:t>
+            </a:r>
+            <a:r>
+              <a:rPr lang="en-US" sz="2200" dirty="0" smtClean="0">
+                <a:latin typeface="Helvetica" charset="0"/>
+                <a:ea typeface="Helvetica" charset="0"/>
+                <a:cs typeface="Helvetica" charset="0"/>
+              </a:rPr>
+              <a:t>Kessler</a:t>
             </a:r>
             <a:endParaRPr lang="en-US" sz="2200" dirty="0">
               <a:latin typeface="Helvetica" charset="0"/>

</xml_diff>